<commit_message>
merge of some stuff
</commit_message>
<xml_diff>
--- a/Documents/lab Meetings/23-06-15/MatlabGUI.pptx
+++ b/Documents/lab Meetings/23-06-15/MatlabGUI.pptx
@@ -8,10 +8,12 @@
     <p:sldId id="256" r:id="rId2"/>
     <p:sldId id="260" r:id="rId3"/>
     <p:sldId id="257" r:id="rId4"/>
-    <p:sldId id="258" r:id="rId5"/>
-    <p:sldId id="259" r:id="rId6"/>
-    <p:sldId id="262" r:id="rId7"/>
-    <p:sldId id="261" r:id="rId8"/>
+    <p:sldId id="263" r:id="rId5"/>
+    <p:sldId id="258" r:id="rId6"/>
+    <p:sldId id="259" r:id="rId7"/>
+    <p:sldId id="264" r:id="rId8"/>
+    <p:sldId id="262" r:id="rId9"/>
+    <p:sldId id="261" r:id="rId10"/>
   </p:sldIdLst>
   <p:sldSz cx="12192000" cy="6858000"/>
   <p:notesSz cx="6858000" cy="9144000"/>
@@ -110,6 +112,11 @@
       </a:defRPr>
     </a:lvl9pPr>
   </p:defaultTextStyle>
+  <p:extLst>
+    <p:ext uri="{EFAFB233-063F-42B5-8137-9DF3F51BA10A}">
+      <p15:sldGuideLst xmlns:p15="http://schemas.microsoft.com/office/powerpoint/2012/main"/>
+    </p:ext>
+  </p:extLst>
 </p:presentation>
 </file>
 
@@ -2987,8 +2994,20 @@
           <a:p>
             <a:pPr rtl="0"/>
             <a:r>
-              <a:rPr lang="en-US" dirty="0" smtClean="0"/>
-              <a:t>A short Introduction to MATLAB GUI</a:t>
+              <a:rPr lang="en-US" smtClean="0"/>
+              <a:t>A </a:t>
+            </a:r>
+            <a:r>
+              <a:rPr lang="en-US" smtClean="0"/>
+              <a:t>Short </a:t>
+            </a:r>
+            <a:r>
+              <a:rPr lang="en-US" dirty="0" smtClean="0"/>
+              <a:t>Introduction to MATLAB </a:t>
+            </a:r>
+            <a:r>
+              <a:rPr lang="en-US" smtClean="0"/>
+              <a:t>GUI Programming </a:t>
             </a:r>
             <a:endParaRPr lang="he-IL" dirty="0"/>
           </a:p>
@@ -3086,8 +3105,17 @@
             <a:pPr algn="l" rtl="0"/>
             <a:r>
               <a:rPr lang="en-US" dirty="0" smtClean="0"/>
-              <a:t>Event driven programing (wait for user response)</a:t>
-            </a:r>
+              <a:t>Event-driven </a:t>
+            </a:r>
+            <a:r>
+              <a:rPr lang="en-US" dirty="0" smtClean="0"/>
+              <a:t>programing (wait for user response</a:t>
+            </a:r>
+            <a:r>
+              <a:rPr lang="en-US" dirty="0" smtClean="0"/>
+              <a:t>).</a:t>
+            </a:r>
+            <a:endParaRPr lang="en-US" dirty="0" smtClean="0"/>
           </a:p>
           <a:p>
             <a:pPr algn="l" rtl="0"/>
@@ -3490,7 +3518,12 @@
             <p:ph type="title"/>
           </p:nvPr>
         </p:nvSpPr>
-        <p:spPr/>
+        <p:spPr>
+          <a:xfrm>
+            <a:off x="838200" y="299024"/>
+            <a:ext cx="10515600" cy="1325563"/>
+          </a:xfrm>
+        </p:spPr>
         <p:txBody>
           <a:bodyPr/>
           <a:lstStyle/>
@@ -3498,7 +3531,7 @@
             <a:pPr algn="l" rtl="0"/>
             <a:r>
               <a:rPr lang="en-US" dirty="0" smtClean="0"/>
-              <a:t>GUIDE</a:t>
+              <a:t>Three main components</a:t>
             </a:r>
             <a:endParaRPr lang="he-IL" dirty="0"/>
           </a:p>
@@ -3514,7 +3547,12 @@
             <p:ph idx="1"/>
           </p:nvPr>
         </p:nvSpPr>
-        <p:spPr/>
+        <p:spPr>
+          <a:xfrm>
+            <a:off x="838200" y="1825625"/>
+            <a:ext cx="10515600" cy="1622655"/>
+          </a:xfrm>
+        </p:spPr>
         <p:txBody>
           <a:bodyPr/>
           <a:lstStyle/>
@@ -3522,71 +3560,118 @@
             <a:pPr algn="l" rtl="0"/>
             <a:r>
               <a:rPr lang="en-US" dirty="0" smtClean="0"/>
-              <a:t>Basic </a:t>
-            </a:r>
-            <a:r>
-              <a:rPr lang="en-US" dirty="0" err="1" smtClean="0"/>
-              <a:t>vb</a:t>
-            </a:r>
-            <a:r>
-              <a:rPr lang="en-US" dirty="0" smtClean="0"/>
-              <a:t>-like </a:t>
-            </a:r>
-            <a:r>
-              <a:rPr lang="en-US" dirty="0" err="1" smtClean="0"/>
-              <a:t>Matlab</a:t>
-            </a:r>
-            <a:r>
-              <a:rPr lang="en-US" dirty="0" smtClean="0"/>
-              <a:t> tool to create GUIs</a:t>
+              <a:t>Callbacks</a:t>
             </a:r>
           </a:p>
           <a:p>
             <a:pPr algn="l" rtl="0"/>
             <a:r>
               <a:rPr lang="en-US" dirty="0" smtClean="0"/>
-              <a:t>callbacks</a:t>
+              <a:t>Handles</a:t>
             </a:r>
           </a:p>
           <a:p>
             <a:pPr algn="l" rtl="0"/>
             <a:r>
-              <a:rPr lang="en-US" dirty="0"/>
-              <a:t>H</a:t>
-            </a:r>
-            <a:r>
-              <a:rPr lang="en-US" dirty="0" smtClean="0"/>
-              <a:t>andles</a:t>
+              <a:rPr lang="en-US" dirty="0" smtClean="0"/>
+              <a:t>Event-listeners</a:t>
             </a:r>
           </a:p>
           <a:p>
             <a:pPr algn="l" rtl="0"/>
-            <a:r>
-              <a:rPr lang="en-US" dirty="0" smtClean="0"/>
-              <a:t>Handles</a:t>
-            </a:r>
-          </a:p>
-          <a:p>
-            <a:pPr algn="l" rtl="0"/>
-            <a:r>
-              <a:rPr lang="en-US" dirty="0"/>
-              <a:t>H</a:t>
-            </a:r>
-            <a:r>
-              <a:rPr lang="en-US" dirty="0" smtClean="0"/>
-              <a:t>andles</a:t>
-            </a:r>
+            <a:endParaRPr lang="en-US" dirty="0" smtClean="0"/>
           </a:p>
           <a:p>
             <a:pPr algn="l" rtl="0"/>
             <a:endParaRPr lang="he-IL" dirty="0"/>
+          </a:p>
+        </p:txBody>
+      </p:sp>
+      <p:sp>
+        <p:nvSpPr>
+          <p:cNvPr id="4" name="Title 1"/>
+          <p:cNvSpPr txBox="1">
+            <a:spLocks/>
+          </p:cNvSpPr>
+          <p:nvPr/>
+        </p:nvSpPr>
+        <p:spPr>
+          <a:xfrm>
+            <a:off x="838200" y="3338512"/>
+            <a:ext cx="10515600" cy="1325563"/>
+          </a:xfrm>
+          <a:prstGeom prst="rect">
+            <a:avLst/>
+          </a:prstGeom>
+        </p:spPr>
+        <p:txBody>
+          <a:bodyPr vert="horz" lIns="91440" tIns="45720" rIns="91440" bIns="45720" rtlCol="1" anchor="ctr">
+            <a:normAutofit/>
+          </a:bodyPr>
+          <a:lstStyle>
+            <a:lvl1pPr algn="r" defTabSz="914400" rtl="1" eaLnBrk="1" latinLnBrk="0" hangingPunct="1">
+              <a:lnSpc>
+                <a:spcPct val="90000"/>
+              </a:lnSpc>
+              <a:spcBef>
+                <a:spcPct val="0"/>
+              </a:spcBef>
+              <a:buNone/>
+              <a:defRPr sz="4400" kern="1200">
+                <a:solidFill>
+                  <a:schemeClr val="tx1"/>
+                </a:solidFill>
+                <a:latin typeface="+mj-lt"/>
+                <a:ea typeface="+mj-ea"/>
+                <a:cs typeface="+mj-cs"/>
+              </a:defRPr>
+            </a:lvl1pPr>
+          </a:lstStyle>
+          <a:p>
+            <a:pPr algn="l" rtl="0"/>
+            <a:r>
+              <a:rPr lang="en-US" dirty="0" smtClean="0"/>
+              <a:t>One main structure</a:t>
+            </a:r>
+            <a:endParaRPr lang="he-IL" dirty="0"/>
+          </a:p>
+        </p:txBody>
+      </p:sp>
+      <p:sp>
+        <p:nvSpPr>
+          <p:cNvPr id="5" name="TextBox 4"/>
+          <p:cNvSpPr txBox="1"/>
+          <p:nvPr/>
+        </p:nvSpPr>
+        <p:spPr>
+          <a:xfrm>
+            <a:off x="838200" y="4450814"/>
+            <a:ext cx="4703284" cy="584775"/>
+          </a:xfrm>
+          <a:prstGeom prst="rect">
+            <a:avLst/>
+          </a:prstGeom>
+          <a:noFill/>
+        </p:spPr>
+        <p:txBody>
+          <a:bodyPr wrap="square" rtlCol="1">
+            <a:spAutoFit/>
+          </a:bodyPr>
+          <a:lstStyle/>
+          <a:p>
+            <a:pPr algn="l" rtl="0"/>
+            <a:r>
+              <a:rPr lang="en-US" sz="3200" dirty="0" smtClean="0"/>
+              <a:t>class</a:t>
+            </a:r>
+            <a:endParaRPr lang="he-IL" sz="3200" dirty="0"/>
           </a:p>
         </p:txBody>
       </p:sp>
     </p:spTree>
     <p:extLst>
       <p:ext uri="{BB962C8B-B14F-4D97-AF65-F5344CB8AC3E}">
-        <p14:creationId xmlns:p14="http://schemas.microsoft.com/office/powerpoint/2010/main" val="848488257"/>
+        <p14:creationId xmlns:p14="http://schemas.microsoft.com/office/powerpoint/2010/main" val="3928280109"/>
       </p:ext>
     </p:extLst>
   </p:cSld>
@@ -3630,8 +3715,12 @@
           <a:p>
             <a:pPr algn="l" rtl="0"/>
             <a:r>
-              <a:rPr lang="en-US" dirty="0" smtClean="0"/>
-              <a:t>Classes</a:t>
+              <a:rPr lang="en-US" dirty="0" err="1" smtClean="0"/>
+              <a:t>Matlab’s</a:t>
+            </a:r>
+            <a:r>
+              <a:rPr lang="en-US" dirty="0" smtClean="0"/>
+              <a:t> GUIDE</a:t>
             </a:r>
             <a:endParaRPr lang="he-IL" dirty="0"/>
           </a:p>
@@ -3655,20 +3744,59 @@
             <a:pPr algn="l" rtl="0"/>
             <a:r>
               <a:rPr lang="en-US" dirty="0" smtClean="0"/>
-              <a:t>Heavy use of handles, which are just addresses to graphical entities.</a:t>
+              <a:t>Basic </a:t>
+            </a:r>
+            <a:r>
+              <a:rPr lang="en-US" dirty="0" smtClean="0"/>
+              <a:t>VB</a:t>
+            </a:r>
+            <a:r>
+              <a:rPr lang="en-US" dirty="0" smtClean="0"/>
+              <a:t>-like </a:t>
+            </a:r>
+            <a:r>
+              <a:rPr lang="en-US" dirty="0" err="1" smtClean="0"/>
+              <a:t>Matlab</a:t>
+            </a:r>
+            <a:r>
+              <a:rPr lang="en-US" dirty="0" smtClean="0"/>
+              <a:t> tool to create </a:t>
+            </a:r>
+            <a:r>
+              <a:rPr lang="en-US" dirty="0" smtClean="0"/>
+              <a:t>GUIs</a:t>
             </a:r>
           </a:p>
           <a:p>
             <a:pPr algn="l" rtl="0"/>
             <a:r>
-              <a:rPr lang="en-US" dirty="0" err="1" smtClean="0"/>
-              <a:t>Uicontrol</a:t>
+              <a:rPr lang="en-US" dirty="0" smtClean="0"/>
+              <a:t>A list of functions</a:t>
             </a:r>
             <a:endParaRPr lang="en-US" dirty="0" smtClean="0"/>
           </a:p>
           <a:p>
             <a:pPr algn="l" rtl="0"/>
+            <a:r>
+              <a:rPr lang="en-US" dirty="0"/>
+              <a:t>C</a:t>
+            </a:r>
+            <a:r>
+              <a:rPr lang="en-US" dirty="0" smtClean="0"/>
+              <a:t>allbacks</a:t>
+            </a:r>
             <a:endParaRPr lang="en-US" dirty="0" smtClean="0"/>
+          </a:p>
+          <a:p>
+            <a:pPr algn="l" rtl="0"/>
+            <a:r>
+              <a:rPr lang="en-US" dirty="0"/>
+              <a:t>H</a:t>
+            </a:r>
+            <a:r>
+              <a:rPr lang="en-US" dirty="0" smtClean="0"/>
+              <a:t>andles</a:t>
+            </a:r>
           </a:p>
           <a:p>
             <a:pPr algn="l" rtl="0"/>
@@ -3679,7 +3807,7 @@
     </p:spTree>
     <p:extLst>
       <p:ext uri="{BB962C8B-B14F-4D97-AF65-F5344CB8AC3E}">
-        <p14:creationId xmlns:p14="http://schemas.microsoft.com/office/powerpoint/2010/main" val="3304728279"/>
+        <p14:creationId xmlns:p14="http://schemas.microsoft.com/office/powerpoint/2010/main" val="848488257"/>
       </p:ext>
     </p:extLst>
   </p:cSld>
@@ -3724,7 +3852,7 @@
             <a:pPr algn="l" rtl="0"/>
             <a:r>
               <a:rPr lang="en-US" dirty="0" smtClean="0"/>
-              <a:t>Advices</a:t>
+              <a:t>Classes</a:t>
             </a:r>
             <a:endParaRPr lang="he-IL" dirty="0"/>
           </a:p>
@@ -3740,26 +3868,298 @@
             <p:ph idx="1"/>
           </p:nvPr>
         </p:nvSpPr>
-        <p:spPr/>
-        <p:txBody>
-          <a:bodyPr/>
+        <p:spPr>
+          <a:xfrm>
+            <a:off x="838200" y="1454227"/>
+            <a:ext cx="10515600" cy="4722736"/>
+          </a:xfrm>
+        </p:spPr>
+        <p:txBody>
+          <a:bodyPr>
+            <a:normAutofit fontScale="62500" lnSpcReduction="20000"/>
+          </a:bodyPr>
           <a:lstStyle/>
           <a:p>
             <a:pPr algn="l" rtl="0"/>
             <a:r>
               <a:rPr lang="en-US" dirty="0" smtClean="0"/>
-              <a:t>Keep it modular</a:t>
+              <a:t>More of an object-oriented approach than GUIDE</a:t>
             </a:r>
           </a:p>
           <a:p>
             <a:pPr algn="l" rtl="0"/>
             <a:r>
               <a:rPr lang="en-US" dirty="0" smtClean="0"/>
-              <a:t>Group classes intuitively</a:t>
+              <a:t>Use </a:t>
+            </a:r>
+            <a:r>
+              <a:rPr lang="en-US" dirty="0" smtClean="0"/>
+              <a:t>of handles, which are just addresses to graphical entities.</a:t>
             </a:r>
           </a:p>
           <a:p>
             <a:pPr algn="l" rtl="0"/>
+            <a:r>
+              <a:rPr lang="en-US" dirty="0" err="1" smtClean="0"/>
+              <a:t>Uicontrol</a:t>
+            </a:r>
+            <a:r>
+              <a:rPr lang="en-US" dirty="0" smtClean="0"/>
+              <a:t> to link to graphics</a:t>
+            </a:r>
+          </a:p>
+          <a:p>
+            <a:pPr algn="l" rtl="0"/>
+            <a:r>
+              <a:rPr lang="en-US" dirty="0" smtClean="0"/>
+              <a:t>Event-listeners</a:t>
+            </a:r>
+            <a:endParaRPr lang="en-US" dirty="0" smtClean="0"/>
+          </a:p>
+          <a:p>
+            <a:pPr algn="l" rtl="0"/>
+            <a:endParaRPr lang="en-US" dirty="0" smtClean="0"/>
+          </a:p>
+          <a:p>
+            <a:pPr algn="l" rtl="0"/>
+            <a:r>
+              <a:rPr lang="en-US" dirty="0" smtClean="0"/>
+              <a:t>Structure: </a:t>
+            </a:r>
+            <a:br>
+              <a:rPr lang="en-US" dirty="0" smtClean="0"/>
+            </a:br>
+            <a:r>
+              <a:rPr lang="en-US" dirty="0" err="1" smtClean="0">
+                <a:solidFill>
+                  <a:srgbClr val="0070C0"/>
+                </a:solidFill>
+              </a:rPr>
+              <a:t>classdef</a:t>
+            </a:r>
+            <a:r>
+              <a:rPr lang="en-US" dirty="0" smtClean="0">
+                <a:solidFill>
+                  <a:srgbClr val="0070C0"/>
+                </a:solidFill>
+              </a:rPr>
+              <a:t> </a:t>
+            </a:r>
+            <a:r>
+              <a:rPr lang="en-US" dirty="0" err="1" smtClean="0"/>
+              <a:t>myCLass</a:t>
+            </a:r>
+            <a:r>
+              <a:rPr lang="en-US" dirty="0" smtClean="0"/>
+              <a:t>&lt;handle</a:t>
+            </a:r>
+            <a:br>
+              <a:rPr lang="en-US" dirty="0" smtClean="0"/>
+            </a:br>
+            <a:r>
+              <a:rPr lang="en-US" dirty="0" smtClean="0"/>
+              <a:t> </a:t>
+            </a:r>
+            <a:br>
+              <a:rPr lang="en-US" dirty="0" smtClean="0"/>
+            </a:br>
+            <a:r>
+              <a:rPr lang="en-US" dirty="0" smtClean="0">
+                <a:solidFill>
+                  <a:srgbClr val="0070C0"/>
+                </a:solidFill>
+              </a:rPr>
+              <a:t>properties</a:t>
+            </a:r>
+            <a:r>
+              <a:rPr lang="en-US" dirty="0" smtClean="0"/>
+              <a:t> (</a:t>
+            </a:r>
+            <a:r>
+              <a:rPr lang="en-US" dirty="0" err="1" smtClean="0"/>
+              <a:t>propertyVal</a:t>
+            </a:r>
+            <a:r>
+              <a:rPr lang="en-US" dirty="0" smtClean="0"/>
+              <a:t>)</a:t>
+            </a:r>
+            <a:br>
+              <a:rPr lang="en-US" dirty="0" smtClean="0"/>
+            </a:br>
+            <a:r>
+              <a:rPr lang="en-US" dirty="0" smtClean="0"/>
+              <a:t> </a:t>
+            </a:r>
+            <a:r>
+              <a:rPr lang="en-US" dirty="0" smtClean="0">
+                <a:solidFill>
+                  <a:srgbClr val="0070C0"/>
+                </a:solidFill>
+              </a:rPr>
+              <a:t>end</a:t>
+            </a:r>
+            <a:r>
+              <a:rPr lang="en-US" dirty="0" smtClean="0"/>
+              <a:t/>
+            </a:r>
+            <a:br>
+              <a:rPr lang="en-US" dirty="0" smtClean="0"/>
+            </a:br>
+            <a:r>
+              <a:rPr lang="en-US" dirty="0" smtClean="0"/>
+              <a:t/>
+            </a:r>
+            <a:br>
+              <a:rPr lang="en-US" dirty="0" smtClean="0"/>
+            </a:br>
+            <a:r>
+              <a:rPr lang="en-US" dirty="0" smtClean="0">
+                <a:solidFill>
+                  <a:srgbClr val="0070C0"/>
+                </a:solidFill>
+              </a:rPr>
+              <a:t>events</a:t>
+            </a:r>
+            <a:r>
+              <a:rPr lang="en-US" dirty="0" smtClean="0"/>
+              <a:t/>
+            </a:r>
+            <a:br>
+              <a:rPr lang="en-US" dirty="0" smtClean="0"/>
+            </a:br>
+            <a:r>
+              <a:rPr lang="en-US" dirty="0" smtClean="0">
+                <a:solidFill>
+                  <a:srgbClr val="0070C0"/>
+                </a:solidFill>
+              </a:rPr>
+              <a:t>end</a:t>
+            </a:r>
+            <a:r>
+              <a:rPr lang="en-US" dirty="0" smtClean="0"/>
+              <a:t/>
+            </a:r>
+            <a:br>
+              <a:rPr lang="en-US" dirty="0" smtClean="0"/>
+            </a:br>
+            <a:r>
+              <a:rPr lang="en-US" dirty="0" smtClean="0"/>
+              <a:t/>
+            </a:r>
+            <a:br>
+              <a:rPr lang="en-US" dirty="0" smtClean="0"/>
+            </a:br>
+            <a:r>
+              <a:rPr lang="en-US" dirty="0" smtClean="0"/>
+              <a:t> </a:t>
+            </a:r>
+            <a:r>
+              <a:rPr lang="en-US" dirty="0" smtClean="0">
+                <a:solidFill>
+                  <a:srgbClr val="0070C0"/>
+                </a:solidFill>
+              </a:rPr>
+              <a:t>methods</a:t>
+            </a:r>
+            <a:r>
+              <a:rPr lang="en-US" dirty="0" smtClean="0"/>
+              <a:t> (</a:t>
+            </a:r>
+            <a:r>
+              <a:rPr lang="en-US" dirty="0" err="1" smtClean="0"/>
+              <a:t>properyVal</a:t>
+            </a:r>
+            <a:r>
+              <a:rPr lang="en-US" dirty="0" smtClean="0"/>
+              <a:t>)</a:t>
+            </a:r>
+            <a:br>
+              <a:rPr lang="en-US" dirty="0" smtClean="0"/>
+            </a:br>
+            <a:r>
+              <a:rPr lang="en-US" dirty="0" smtClean="0"/>
+              <a:t>  </a:t>
+            </a:r>
+            <a:br>
+              <a:rPr lang="en-US" dirty="0" smtClean="0"/>
+            </a:br>
+            <a:r>
+              <a:rPr lang="en-US" dirty="0" smtClean="0"/>
+              <a:t>  </a:t>
+            </a:r>
+            <a:r>
+              <a:rPr lang="en-US" dirty="0" smtClean="0">
+                <a:solidFill>
+                  <a:srgbClr val="0070C0"/>
+                </a:solidFill>
+              </a:rPr>
+              <a:t>function</a:t>
+            </a:r>
+            <a:r>
+              <a:rPr lang="en-US" dirty="0" smtClean="0"/>
+              <a:t> </a:t>
+            </a:r>
+            <a:r>
+              <a:rPr lang="en-US" dirty="0" err="1" smtClean="0"/>
+              <a:t>obj</a:t>
+            </a:r>
+            <a:r>
+              <a:rPr lang="en-US" dirty="0" smtClean="0"/>
+              <a:t>=</a:t>
+            </a:r>
+            <a:r>
+              <a:rPr lang="en-US" dirty="0" err="1" smtClean="0"/>
+              <a:t>myClass</a:t>
+            </a:r>
+            <a:r>
+              <a:rPr lang="en-US" dirty="0" smtClean="0"/>
+              <a:t> </a:t>
+            </a:r>
+            <a:br>
+              <a:rPr lang="en-US" dirty="0" smtClean="0"/>
+            </a:br>
+            <a:r>
+              <a:rPr lang="en-US" dirty="0" smtClean="0"/>
+              <a:t>  </a:t>
+            </a:r>
+            <a:r>
+              <a:rPr lang="en-US" dirty="0" smtClean="0">
+                <a:solidFill>
+                  <a:srgbClr val="0070C0"/>
+                </a:solidFill>
+              </a:rPr>
+              <a:t>end</a:t>
+            </a:r>
+            <a:r>
+              <a:rPr lang="en-US" dirty="0" smtClean="0"/>
+              <a:t/>
+            </a:r>
+            <a:br>
+              <a:rPr lang="en-US" dirty="0" smtClean="0"/>
+            </a:br>
+            <a:r>
+              <a:rPr lang="en-US" dirty="0" err="1" smtClean="0">
+                <a:solidFill>
+                  <a:srgbClr val="0070C0"/>
+                </a:solidFill>
+              </a:rPr>
+              <a:t>e</a:t>
+            </a:r>
+            <a:r>
+              <a:rPr lang="en-US" dirty="0" err="1" smtClean="0">
+                <a:solidFill>
+                  <a:srgbClr val="0070C0"/>
+                </a:solidFill>
+              </a:rPr>
+              <a:t>nd</a:t>
+            </a:r>
+            <a:r>
+              <a:rPr lang="en-US" dirty="0" smtClean="0"/>
+              <a:t/>
+            </a:r>
+            <a:br>
+              <a:rPr lang="en-US" dirty="0" smtClean="0"/>
+            </a:br>
             <a:endParaRPr lang="he-IL" dirty="0"/>
           </a:p>
         </p:txBody>
@@ -3767,7 +4167,7 @@
     </p:spTree>
     <p:extLst>
       <p:ext uri="{BB962C8B-B14F-4D97-AF65-F5344CB8AC3E}">
-        <p14:creationId xmlns:p14="http://schemas.microsoft.com/office/powerpoint/2010/main" val="3558887508"/>
+        <p14:creationId xmlns:p14="http://schemas.microsoft.com/office/powerpoint/2010/main" val="3304728279"/>
       </p:ext>
     </p:extLst>
   </p:cSld>
@@ -3812,7 +4212,566 @@
             <a:pPr algn="l" rtl="0"/>
             <a:r>
               <a:rPr lang="en-US" dirty="0" smtClean="0"/>
-              <a:t>Resources</a:t>
+              <a:t>Event-listeners</a:t>
+            </a:r>
+            <a:endParaRPr lang="he-IL" dirty="0"/>
+          </a:p>
+        </p:txBody>
+      </p:sp>
+      <p:sp>
+        <p:nvSpPr>
+          <p:cNvPr id="3" name="Content Placeholder 2"/>
+          <p:cNvSpPr>
+            <a:spLocks noGrp="1"/>
+          </p:cNvSpPr>
+          <p:nvPr>
+            <p:ph idx="1"/>
+          </p:nvPr>
+        </p:nvSpPr>
+        <p:spPr/>
+        <p:txBody>
+          <a:bodyPr/>
+          <a:lstStyle/>
+          <a:p>
+            <a:pPr algn="l" rtl="0"/>
+            <a:r>
+              <a:rPr lang="en-US" dirty="0" smtClean="0"/>
+              <a:t>Connect two GUIs/classes without proper acquaintance between them</a:t>
+            </a:r>
+          </a:p>
+          <a:p>
+            <a:pPr algn="l" rtl="0"/>
+            <a:r>
+              <a:rPr lang="en-US" dirty="0" smtClean="0"/>
+              <a:t>A class notifies about an event happening</a:t>
+            </a:r>
+          </a:p>
+          <a:p>
+            <a:pPr algn="l" rtl="0"/>
+            <a:r>
+              <a:rPr lang="en-US" dirty="0" smtClean="0"/>
+              <a:t>All classes listening to the event activate a function/sequence</a:t>
+            </a:r>
+          </a:p>
+          <a:p>
+            <a:pPr algn="l" rtl="0"/>
+            <a:endParaRPr lang="he-IL" dirty="0"/>
+          </a:p>
+        </p:txBody>
+      </p:sp>
+      <p:sp>
+        <p:nvSpPr>
+          <p:cNvPr id="4" name="Rectangle 3"/>
+          <p:cNvSpPr/>
+          <p:nvPr/>
+        </p:nvSpPr>
+        <p:spPr>
+          <a:xfrm>
+            <a:off x="1828800" y="4935557"/>
+            <a:ext cx="1828800" cy="1509310"/>
+          </a:xfrm>
+          <a:prstGeom prst="rect">
+            <a:avLst/>
+          </a:prstGeom>
+        </p:spPr>
+        <p:style>
+          <a:lnRef idx="2">
+            <a:schemeClr val="accent4">
+              <a:shade val="50000"/>
+            </a:schemeClr>
+          </a:lnRef>
+          <a:fillRef idx="1">
+            <a:schemeClr val="accent4"/>
+          </a:fillRef>
+          <a:effectRef idx="0">
+            <a:schemeClr val="accent4"/>
+          </a:effectRef>
+          <a:fontRef idx="minor">
+            <a:schemeClr val="lt1"/>
+          </a:fontRef>
+        </p:style>
+        <p:txBody>
+          <a:bodyPr rtlCol="1" anchor="ctr"/>
+          <a:lstStyle/>
+          <a:p>
+            <a:pPr algn="ctr"/>
+            <a:r>
+              <a:rPr lang="en-US" dirty="0" smtClean="0"/>
+              <a:t>Class 1</a:t>
+            </a:r>
+            <a:endParaRPr lang="he-IL" dirty="0"/>
+          </a:p>
+        </p:txBody>
+      </p:sp>
+      <p:sp>
+        <p:nvSpPr>
+          <p:cNvPr id="5" name="Rectangle 4"/>
+          <p:cNvSpPr/>
+          <p:nvPr/>
+        </p:nvSpPr>
+        <p:spPr>
+          <a:xfrm>
+            <a:off x="3977089" y="3944039"/>
+            <a:ext cx="2622015" cy="771180"/>
+          </a:xfrm>
+          <a:prstGeom prst="rect">
+            <a:avLst/>
+          </a:prstGeom>
+        </p:spPr>
+        <p:style>
+          <a:lnRef idx="2">
+            <a:schemeClr val="accent1">
+              <a:shade val="50000"/>
+            </a:schemeClr>
+          </a:lnRef>
+          <a:fillRef idx="1">
+            <a:schemeClr val="accent1"/>
+          </a:fillRef>
+          <a:effectRef idx="0">
+            <a:schemeClr val="accent1"/>
+          </a:effectRef>
+          <a:fontRef idx="minor">
+            <a:schemeClr val="lt1"/>
+          </a:fontRef>
+        </p:style>
+        <p:txBody>
+          <a:bodyPr rtlCol="1" anchor="ctr"/>
+          <a:lstStyle/>
+          <a:p>
+            <a:pPr algn="ctr"/>
+            <a:r>
+              <a:rPr lang="en-US" dirty="0" smtClean="0"/>
+              <a:t>manager</a:t>
+            </a:r>
+            <a:endParaRPr lang="he-IL" dirty="0"/>
+          </a:p>
+        </p:txBody>
+      </p:sp>
+      <p:sp>
+        <p:nvSpPr>
+          <p:cNvPr id="6" name="Rectangle 5"/>
+          <p:cNvSpPr/>
+          <p:nvPr/>
+        </p:nvSpPr>
+        <p:spPr>
+          <a:xfrm>
+            <a:off x="6786391" y="5001658"/>
+            <a:ext cx="1861850" cy="1377108"/>
+          </a:xfrm>
+          <a:prstGeom prst="rect">
+            <a:avLst/>
+          </a:prstGeom>
+        </p:spPr>
+        <p:style>
+          <a:lnRef idx="2">
+            <a:schemeClr val="accent2">
+              <a:shade val="50000"/>
+            </a:schemeClr>
+          </a:lnRef>
+          <a:fillRef idx="1">
+            <a:schemeClr val="accent2"/>
+          </a:fillRef>
+          <a:effectRef idx="0">
+            <a:schemeClr val="accent2"/>
+          </a:effectRef>
+          <a:fontRef idx="minor">
+            <a:schemeClr val="lt1"/>
+          </a:fontRef>
+        </p:style>
+        <p:txBody>
+          <a:bodyPr rtlCol="1" anchor="ctr"/>
+          <a:lstStyle/>
+          <a:p>
+            <a:pPr algn="ctr"/>
+            <a:r>
+              <a:rPr lang="en-US" dirty="0" smtClean="0"/>
+              <a:t>Class 2</a:t>
+            </a:r>
+            <a:endParaRPr lang="he-IL" dirty="0"/>
+          </a:p>
+        </p:txBody>
+      </p:sp>
+      <p:cxnSp>
+        <p:nvCxnSpPr>
+          <p:cNvPr id="8" name="Straight Arrow Connector 7"/>
+          <p:cNvCxnSpPr/>
+          <p:nvPr/>
+        </p:nvCxnSpPr>
+        <p:spPr>
+          <a:xfrm>
+            <a:off x="6599104" y="4377177"/>
+            <a:ext cx="712057" cy="676083"/>
+          </a:xfrm>
+          <a:prstGeom prst="straightConnector1">
+            <a:avLst/>
+          </a:prstGeom>
+          <a:ln>
+            <a:tailEnd type="triangle"/>
+          </a:ln>
+        </p:spPr>
+        <p:style>
+          <a:lnRef idx="1">
+            <a:schemeClr val="accent1"/>
+          </a:lnRef>
+          <a:fillRef idx="0">
+            <a:schemeClr val="accent1"/>
+          </a:fillRef>
+          <a:effectRef idx="0">
+            <a:schemeClr val="accent1"/>
+          </a:effectRef>
+          <a:fontRef idx="minor">
+            <a:schemeClr val="tx1"/>
+          </a:fontRef>
+        </p:style>
+      </p:cxnSp>
+      <p:sp>
+        <p:nvSpPr>
+          <p:cNvPr id="9" name="TextBox 8"/>
+          <p:cNvSpPr txBox="1"/>
+          <p:nvPr/>
+        </p:nvSpPr>
+        <p:spPr>
+          <a:xfrm>
+            <a:off x="1828800" y="4106557"/>
+            <a:ext cx="1035585" cy="923330"/>
+          </a:xfrm>
+          <a:prstGeom prst="rect">
+            <a:avLst/>
+          </a:prstGeom>
+          <a:noFill/>
+        </p:spPr>
+        <p:txBody>
+          <a:bodyPr wrap="square" rtlCol="1">
+            <a:spAutoFit/>
+          </a:bodyPr>
+          <a:lstStyle/>
+          <a:p>
+            <a:pPr algn="l" rtl="0"/>
+            <a:r>
+              <a:rPr lang="en-US" dirty="0" smtClean="0"/>
+              <a:t>Notify about event 1</a:t>
+            </a:r>
+            <a:endParaRPr lang="he-IL" dirty="0"/>
+          </a:p>
+        </p:txBody>
+      </p:sp>
+      <p:sp>
+        <p:nvSpPr>
+          <p:cNvPr id="10" name="Lightning Bolt 9"/>
+          <p:cNvSpPr/>
+          <p:nvPr/>
+        </p:nvSpPr>
+        <p:spPr>
+          <a:xfrm rot="12936081">
+            <a:off x="2523146" y="3993614"/>
+            <a:ext cx="760164" cy="1189822"/>
+          </a:xfrm>
+          <a:prstGeom prst="lightningBolt">
+            <a:avLst/>
+          </a:prstGeom>
+        </p:spPr>
+        <p:style>
+          <a:lnRef idx="2">
+            <a:schemeClr val="accent1">
+              <a:shade val="50000"/>
+            </a:schemeClr>
+          </a:lnRef>
+          <a:fillRef idx="1">
+            <a:schemeClr val="accent1"/>
+          </a:fillRef>
+          <a:effectRef idx="0">
+            <a:schemeClr val="accent1"/>
+          </a:effectRef>
+          <a:fontRef idx="minor">
+            <a:schemeClr val="lt1"/>
+          </a:fontRef>
+        </p:style>
+        <p:txBody>
+          <a:bodyPr rtlCol="1" anchor="ctr"/>
+          <a:lstStyle/>
+          <a:p>
+            <a:pPr algn="ctr"/>
+            <a:endParaRPr lang="he-IL"/>
+          </a:p>
+        </p:txBody>
+      </p:sp>
+      <p:cxnSp>
+        <p:nvCxnSpPr>
+          <p:cNvPr id="14" name="Straight Arrow Connector 13"/>
+          <p:cNvCxnSpPr/>
+          <p:nvPr/>
+        </p:nvCxnSpPr>
+        <p:spPr>
+          <a:xfrm flipH="1">
+            <a:off x="3411812" y="4511130"/>
+            <a:ext cx="565277" cy="424427"/>
+          </a:xfrm>
+          <a:prstGeom prst="straightConnector1">
+            <a:avLst/>
+          </a:prstGeom>
+          <a:ln>
+            <a:tailEnd type="triangle"/>
+          </a:ln>
+        </p:spPr>
+        <p:style>
+          <a:lnRef idx="1">
+            <a:schemeClr val="accent1"/>
+          </a:lnRef>
+          <a:fillRef idx="0">
+            <a:schemeClr val="accent1"/>
+          </a:fillRef>
+          <a:effectRef idx="0">
+            <a:schemeClr val="accent1"/>
+          </a:effectRef>
+          <a:fontRef idx="minor">
+            <a:schemeClr val="tx1"/>
+          </a:fontRef>
+        </p:style>
+      </p:cxnSp>
+      <p:sp>
+        <p:nvSpPr>
+          <p:cNvPr id="15" name="TextBox 14"/>
+          <p:cNvSpPr txBox="1"/>
+          <p:nvPr/>
+        </p:nvSpPr>
+        <p:spPr>
+          <a:xfrm>
+            <a:off x="7041355" y="4302240"/>
+            <a:ext cx="1606886" cy="646331"/>
+          </a:xfrm>
+          <a:prstGeom prst="rect">
+            <a:avLst/>
+          </a:prstGeom>
+          <a:noFill/>
+        </p:spPr>
+        <p:txBody>
+          <a:bodyPr wrap="square" rtlCol="1">
+            <a:spAutoFit/>
+          </a:bodyPr>
+          <a:lstStyle/>
+          <a:p>
+            <a:pPr algn="l" rtl="0"/>
+            <a:r>
+              <a:rPr lang="en-US" dirty="0" smtClean="0"/>
+              <a:t>Register to event 1</a:t>
+            </a:r>
+            <a:endParaRPr lang="he-IL" dirty="0"/>
+          </a:p>
+        </p:txBody>
+      </p:sp>
+      <p:cxnSp>
+        <p:nvCxnSpPr>
+          <p:cNvPr id="17" name="Straight Arrow Connector 16"/>
+          <p:cNvCxnSpPr/>
+          <p:nvPr/>
+        </p:nvCxnSpPr>
+        <p:spPr>
+          <a:xfrm>
+            <a:off x="8648241" y="5497417"/>
+            <a:ext cx="1355075" cy="11017"/>
+          </a:xfrm>
+          <a:prstGeom prst="straightConnector1">
+            <a:avLst/>
+          </a:prstGeom>
+          <a:ln>
+            <a:tailEnd type="triangle"/>
+          </a:ln>
+        </p:spPr>
+        <p:style>
+          <a:lnRef idx="1">
+            <a:schemeClr val="accent1"/>
+          </a:lnRef>
+          <a:fillRef idx="0">
+            <a:schemeClr val="accent1"/>
+          </a:fillRef>
+          <a:effectRef idx="0">
+            <a:schemeClr val="accent1"/>
+          </a:effectRef>
+          <a:fontRef idx="minor">
+            <a:schemeClr val="tx1"/>
+          </a:fontRef>
+        </p:style>
+      </p:cxnSp>
+      <p:sp>
+        <p:nvSpPr>
+          <p:cNvPr id="18" name="TextBox 17"/>
+          <p:cNvSpPr txBox="1"/>
+          <p:nvPr/>
+        </p:nvSpPr>
+        <p:spPr>
+          <a:xfrm>
+            <a:off x="10003316" y="5293502"/>
+            <a:ext cx="1350484" cy="369332"/>
+          </a:xfrm>
+          <a:prstGeom prst="rect">
+            <a:avLst/>
+          </a:prstGeom>
+          <a:noFill/>
+        </p:spPr>
+        <p:txBody>
+          <a:bodyPr wrap="square" rtlCol="1">
+            <a:spAutoFit/>
+          </a:bodyPr>
+          <a:lstStyle/>
+          <a:p>
+            <a:pPr algn="l" rtl="0"/>
+            <a:r>
+              <a:rPr lang="en-US" dirty="0" smtClean="0"/>
+              <a:t>action</a:t>
+            </a:r>
+            <a:endParaRPr lang="he-IL" dirty="0"/>
+          </a:p>
+        </p:txBody>
+      </p:sp>
+    </p:spTree>
+    <p:extLst>
+      <p:ext uri="{BB962C8B-B14F-4D97-AF65-F5344CB8AC3E}">
+        <p14:creationId xmlns:p14="http://schemas.microsoft.com/office/powerpoint/2010/main" val="2719107037"/>
+      </p:ext>
+    </p:extLst>
+  </p:cSld>
+  <p:clrMapOvr>
+    <a:masterClrMapping/>
+  </p:clrMapOvr>
+</p:sld>
+</file>
+
+<file path=ppt/slides/slide8.xml><?xml version="1.0" encoding="utf-8"?>
+<p:sld xmlns:a="http://schemas.openxmlformats.org/drawingml/2006/main" xmlns:r="http://schemas.openxmlformats.org/officeDocument/2006/relationships" xmlns:p="http://schemas.openxmlformats.org/presentationml/2006/main">
+  <p:cSld>
+    <p:spTree>
+      <p:nvGrpSpPr>
+        <p:cNvPr id="1" name=""/>
+        <p:cNvGrpSpPr/>
+        <p:nvPr/>
+      </p:nvGrpSpPr>
+      <p:grpSpPr>
+        <a:xfrm>
+          <a:off x="0" y="0"/>
+          <a:ext cx="0" cy="0"/>
+          <a:chOff x="0" y="0"/>
+          <a:chExt cx="0" cy="0"/>
+        </a:xfrm>
+      </p:grpSpPr>
+      <p:sp>
+        <p:nvSpPr>
+          <p:cNvPr id="2" name="Title 1"/>
+          <p:cNvSpPr>
+            <a:spLocks noGrp="1"/>
+          </p:cNvSpPr>
+          <p:nvPr>
+            <p:ph type="title"/>
+          </p:nvPr>
+        </p:nvSpPr>
+        <p:spPr/>
+        <p:txBody>
+          <a:bodyPr/>
+          <a:lstStyle/>
+          <a:p>
+            <a:pPr algn="l" rtl="0"/>
+            <a:r>
+              <a:rPr lang="en-US" dirty="0" smtClean="0"/>
+              <a:t>Advices</a:t>
+            </a:r>
+            <a:endParaRPr lang="he-IL" dirty="0"/>
+          </a:p>
+        </p:txBody>
+      </p:sp>
+      <p:sp>
+        <p:nvSpPr>
+          <p:cNvPr id="3" name="Content Placeholder 2"/>
+          <p:cNvSpPr>
+            <a:spLocks noGrp="1"/>
+          </p:cNvSpPr>
+          <p:nvPr>
+            <p:ph idx="1"/>
+          </p:nvPr>
+        </p:nvSpPr>
+        <p:spPr/>
+        <p:txBody>
+          <a:bodyPr/>
+          <a:lstStyle/>
+          <a:p>
+            <a:pPr algn="l" rtl="0"/>
+            <a:r>
+              <a:rPr lang="en-US" dirty="0" smtClean="0"/>
+              <a:t>Keep it </a:t>
+            </a:r>
+            <a:r>
+              <a:rPr lang="en-US" dirty="0" smtClean="0"/>
+              <a:t>modular</a:t>
+            </a:r>
+          </a:p>
+          <a:p>
+            <a:pPr algn="l" rtl="0"/>
+            <a:r>
+              <a:rPr lang="en-US" dirty="0" smtClean="0"/>
+              <a:t>Keep it hierarchical </a:t>
+            </a:r>
+            <a:endParaRPr lang="en-US" dirty="0" smtClean="0"/>
+          </a:p>
+          <a:p>
+            <a:pPr algn="l" rtl="0"/>
+            <a:r>
+              <a:rPr lang="en-US" dirty="0" smtClean="0"/>
+              <a:t>Group classes intuitively</a:t>
+            </a:r>
+          </a:p>
+          <a:p>
+            <a:pPr algn="l" rtl="0"/>
+            <a:endParaRPr lang="he-IL" dirty="0"/>
+          </a:p>
+        </p:txBody>
+      </p:sp>
+    </p:spTree>
+    <p:extLst>
+      <p:ext uri="{BB962C8B-B14F-4D97-AF65-F5344CB8AC3E}">
+        <p14:creationId xmlns:p14="http://schemas.microsoft.com/office/powerpoint/2010/main" val="3558887508"/>
+      </p:ext>
+    </p:extLst>
+  </p:cSld>
+  <p:clrMapOvr>
+    <a:masterClrMapping/>
+  </p:clrMapOvr>
+</p:sld>
+</file>
+
+<file path=ppt/slides/slide9.xml><?xml version="1.0" encoding="utf-8"?>
+<p:sld xmlns:a="http://schemas.openxmlformats.org/drawingml/2006/main" xmlns:r="http://schemas.openxmlformats.org/officeDocument/2006/relationships" xmlns:p="http://schemas.openxmlformats.org/presentationml/2006/main">
+  <p:cSld>
+    <p:spTree>
+      <p:nvGrpSpPr>
+        <p:cNvPr id="1" name=""/>
+        <p:cNvGrpSpPr/>
+        <p:nvPr/>
+      </p:nvGrpSpPr>
+      <p:grpSpPr>
+        <a:xfrm>
+          <a:off x="0" y="0"/>
+          <a:ext cx="0" cy="0"/>
+          <a:chOff x="0" y="0"/>
+          <a:chExt cx="0" cy="0"/>
+        </a:xfrm>
+      </p:grpSpPr>
+      <p:sp>
+        <p:nvSpPr>
+          <p:cNvPr id="2" name="Title 1"/>
+          <p:cNvSpPr>
+            <a:spLocks noGrp="1"/>
+          </p:cNvSpPr>
+          <p:nvPr>
+            <p:ph type="title"/>
+          </p:nvPr>
+        </p:nvSpPr>
+        <p:spPr/>
+        <p:txBody>
+          <a:bodyPr/>
+          <a:lstStyle/>
+          <a:p>
+            <a:pPr algn="l" rtl="0"/>
+            <a:r>
+              <a:rPr lang="en-US" dirty="0" smtClean="0"/>
+              <a:t>Advance resources</a:t>
             </a:r>
             <a:endParaRPr lang="he-IL" dirty="0"/>
           </a:p>

</xml_diff>